<commit_message>
Correct errors in ppt
</commit_message>
<xml_diff>
--- a/ProjectManagement/Project Management.pptx
+++ b/ProjectManagement/Project Management.pptx
@@ -6726,7 +6726,7 @@
             <a:fld id="{B61BEF0D-F0BB-DE4B-95CE-6DB70DBA9567}" type="datetimeFigureOut">
               <a:rPr lang="en-US" smtClean="0"/>
               <a:pPr/>
-              <a:t>6/25/2018</a:t>
+              <a:t>7/2/2018</a:t>
             </a:fld>
             <a:endParaRPr lang="en-US" dirty="0"/>
           </a:p>
@@ -7066,7 +7066,7 @@
             <a:fld id="{B61BEF0D-F0BB-DE4B-95CE-6DB70DBA9567}" type="datetimeFigureOut">
               <a:rPr lang="en-US" smtClean="0"/>
               <a:pPr/>
-              <a:t>6/25/2018</a:t>
+              <a:t>7/2/2018</a:t>
             </a:fld>
             <a:endParaRPr lang="en-US" dirty="0"/>
           </a:p>
@@ -7469,7 +7469,7 @@
             <a:fld id="{B61BEF0D-F0BB-DE4B-95CE-6DB70DBA9567}" type="datetimeFigureOut">
               <a:rPr lang="en-US" smtClean="0"/>
               <a:pPr/>
-              <a:t>6/25/2018</a:t>
+              <a:t>7/2/2018</a:t>
             </a:fld>
             <a:endParaRPr lang="en-US" dirty="0"/>
           </a:p>
@@ -7807,7 +7807,7 @@
             <a:fld id="{B61BEF0D-F0BB-DE4B-95CE-6DB70DBA9567}" type="datetimeFigureOut">
               <a:rPr lang="en-US" smtClean="0"/>
               <a:pPr/>
-              <a:t>6/25/2018</a:t>
+              <a:t>7/2/2018</a:t>
             </a:fld>
             <a:endParaRPr lang="en-US" dirty="0"/>
           </a:p>
@@ -8129,7 +8129,7 @@
             <a:fld id="{B61BEF0D-F0BB-DE4B-95CE-6DB70DBA9567}" type="datetimeFigureOut">
               <a:rPr lang="en-US" smtClean="0"/>
               <a:pPr/>
-              <a:t>6/25/2018</a:t>
+              <a:t>7/2/2018</a:t>
             </a:fld>
             <a:endParaRPr lang="en-US" dirty="0"/>
           </a:p>
@@ -8527,7 +8527,7 @@
             <a:fld id="{B61BEF0D-F0BB-DE4B-95CE-6DB70DBA9567}" type="datetimeFigureOut">
               <a:rPr lang="en-US" smtClean="0"/>
               <a:pPr/>
-              <a:t>6/25/2018</a:t>
+              <a:t>7/2/2018</a:t>
             </a:fld>
             <a:endParaRPr lang="en-US" dirty="0"/>
           </a:p>
@@ -8786,7 +8786,7 @@
             <a:fld id="{B61BEF0D-F0BB-DE4B-95CE-6DB70DBA9567}" type="datetimeFigureOut">
               <a:rPr lang="en-US" smtClean="0"/>
               <a:pPr/>
-              <a:t>6/25/2018</a:t>
+              <a:t>7/2/2018</a:t>
             </a:fld>
             <a:endParaRPr lang="en-US" dirty="0"/>
           </a:p>
@@ -9050,7 +9050,7 @@
             <a:fld id="{B61BEF0D-F0BB-DE4B-95CE-6DB70DBA9567}" type="datetimeFigureOut">
               <a:rPr lang="en-US" smtClean="0"/>
               <a:pPr/>
-              <a:t>6/25/2018</a:t>
+              <a:t>7/2/2018</a:t>
             </a:fld>
             <a:endParaRPr lang="en-US" dirty="0"/>
           </a:p>
@@ -9314,7 +9314,7 @@
             <a:fld id="{B61BEF0D-F0BB-DE4B-95CE-6DB70DBA9567}" type="datetimeFigureOut">
               <a:rPr lang="en-US" smtClean="0"/>
               <a:pPr/>
-              <a:t>6/25/2018</a:t>
+              <a:t>7/2/2018</a:t>
             </a:fld>
             <a:endParaRPr lang="en-US" dirty="0"/>
           </a:p>
@@ -9645,7 +9645,7 @@
             <a:fld id="{B61BEF0D-F0BB-DE4B-95CE-6DB70DBA9567}" type="datetimeFigureOut">
               <a:rPr lang="en-US" smtClean="0"/>
               <a:pPr/>
-              <a:t>6/25/2018</a:t>
+              <a:t>7/2/2018</a:t>
             </a:fld>
             <a:endParaRPr lang="en-US" dirty="0"/>
           </a:p>
@@ -9970,7 +9970,7 @@
             <a:fld id="{B61BEF0D-F0BB-DE4B-95CE-6DB70DBA9567}" type="datetimeFigureOut">
               <a:rPr lang="en-US" smtClean="0"/>
               <a:pPr/>
-              <a:t>6/25/2018</a:t>
+              <a:t>7/2/2018</a:t>
             </a:fld>
             <a:endParaRPr lang="en-US" dirty="0"/>
           </a:p>
@@ -10429,7 +10429,7 @@
             <a:fld id="{B61BEF0D-F0BB-DE4B-95CE-6DB70DBA9567}" type="datetimeFigureOut">
               <a:rPr lang="en-US" smtClean="0"/>
               <a:pPr/>
-              <a:t>6/25/2018</a:t>
+              <a:t>7/2/2018</a:t>
             </a:fld>
             <a:endParaRPr lang="en-US" dirty="0"/>
           </a:p>
@@ -10636,7 +10636,7 @@
             <a:fld id="{B61BEF0D-F0BB-DE4B-95CE-6DB70DBA9567}" type="datetimeFigureOut">
               <a:rPr lang="en-US" smtClean="0"/>
               <a:pPr/>
-              <a:t>6/25/2018</a:t>
+              <a:t>7/2/2018</a:t>
             </a:fld>
             <a:endParaRPr lang="en-US" dirty="0"/>
           </a:p>
@@ -10815,7 +10815,7 @@
             <a:fld id="{B61BEF0D-F0BB-DE4B-95CE-6DB70DBA9567}" type="datetimeFigureOut">
               <a:rPr lang="en-US" smtClean="0"/>
               <a:pPr/>
-              <a:t>6/25/2018</a:t>
+              <a:t>7/2/2018</a:t>
             </a:fld>
             <a:endParaRPr lang="en-US" dirty="0"/>
           </a:p>
@@ -11150,7 +11150,7 @@
             <a:fld id="{B61BEF0D-F0BB-DE4B-95CE-6DB70DBA9567}" type="datetimeFigureOut">
               <a:rPr lang="en-US" smtClean="0"/>
               <a:pPr/>
-              <a:t>6/25/2018</a:t>
+              <a:t>7/2/2018</a:t>
             </a:fld>
             <a:endParaRPr lang="en-US" dirty="0"/>
           </a:p>
@@ -11497,7 +11497,7 @@
             <a:fld id="{B61BEF0D-F0BB-DE4B-95CE-6DB70DBA9567}" type="datetimeFigureOut">
               <a:rPr lang="en-US" smtClean="0"/>
               <a:pPr/>
-              <a:t>6/25/2018</a:t>
+              <a:t>7/2/2018</a:t>
             </a:fld>
             <a:endParaRPr lang="en-US" dirty="0"/>
           </a:p>
@@ -13616,7 +13616,7 @@
             <a:fld id="{B61BEF0D-F0BB-DE4B-95CE-6DB70DBA9567}" type="datetimeFigureOut">
               <a:rPr lang="en-US" smtClean="0"/>
               <a:pPr/>
-              <a:t>6/25/2018</a:t>
+              <a:t>7/2/2018</a:t>
             </a:fld>
             <a:endParaRPr lang="en-US" dirty="0"/>
           </a:p>
@@ -16842,7 +16842,7 @@
                   <a:srgbClr val="000000"/>
                 </a:solidFill>
               </a:rPr>
-              <a:t>Once our tasks has been given an expected time of work, we will add up the remaining time needed on each task of our current sprint, in order to build a chart that help us track our progress.</a:t>
+              <a:t>Once our tasks have been given an expected time of work, we will add up the remaining time needed on each task of our current sprint, in order to build a chart that help us track our progress.</a:t>
             </a:r>
           </a:p>
           <a:p>
@@ -17283,15 +17283,7 @@
             </a:r>
             <a:r>
               <a:rPr lang="fr-FR" dirty="0"/>
-              <a:t> in the </a:t>
-            </a:r>
-            <a:r>
-              <a:rPr lang="fr-FR" dirty="0" err="1"/>
-              <a:t>psinrt</a:t>
-            </a:r>
-            <a:r>
-              <a:rPr lang="fr-FR" dirty="0"/>
-              <a:t> </a:t>
+              <a:t> in the sprint </a:t>
             </a:r>
             <a:r>
               <a:rPr lang="fr-FR" dirty="0" err="1"/>
@@ -17950,7 +17942,23 @@
             </a:r>
             <a:r>
               <a:rPr lang="fr-FR" sz="1600" dirty="0"/>
-              <a:t> content </a:t>
+              <a:t> content correct, </a:t>
+            </a:r>
+            <a:r>
+              <a:rPr lang="fr-FR" sz="1600" dirty="0" err="1"/>
+              <a:t>then</a:t>
+            </a:r>
+            <a:r>
+              <a:rPr lang="fr-FR" sz="1600" dirty="0"/>
+              <a:t> the pull </a:t>
+            </a:r>
+            <a:r>
+              <a:rPr lang="fr-FR" sz="1600" dirty="0" err="1"/>
+              <a:t>request</a:t>
+            </a:r>
+            <a:r>
+              <a:rPr lang="fr-FR" sz="1600" dirty="0"/>
+              <a:t> </a:t>
             </a:r>
             <a:r>
               <a:rPr lang="fr-FR" sz="1600" dirty="0" err="1"/>
@@ -17958,35 +17966,19 @@
             </a:r>
             <a:r>
               <a:rPr lang="fr-FR" sz="1600" dirty="0"/>
-              <a:t> correct, </a:t>
-            </a:r>
-            <a:r>
-              <a:rPr lang="fr-FR" sz="1600" dirty="0" err="1"/>
-              <a:t>then</a:t>
-            </a:r>
-            <a:r>
-              <a:rPr lang="fr-FR" sz="1600" dirty="0"/>
-              <a:t> the pull </a:t>
-            </a:r>
-            <a:r>
-              <a:rPr lang="fr-FR" sz="1600" dirty="0" err="1"/>
-              <a:t>request</a:t>
-            </a:r>
-            <a:r>
-              <a:rPr lang="fr-FR" sz="1600" dirty="0"/>
-              <a:t> </a:t>
-            </a:r>
-            <a:r>
-              <a:rPr lang="fr-FR" sz="1600" dirty="0" err="1"/>
-              <a:t>is</a:t>
-            </a:r>
-            <a:r>
-              <a:rPr lang="fr-FR" sz="1600" dirty="0"/>
               <a:t> </a:t>
             </a:r>
             <a:r>
               <a:rPr lang="fr-FR" sz="1600" dirty="0" err="1"/>
               <a:t>accepted</a:t>
+            </a:r>
+            <a:r>
+              <a:rPr lang="fr-FR" sz="1600" dirty="0"/>
+              <a:t> and </a:t>
+            </a:r>
+            <a:r>
+              <a:rPr lang="fr-FR" sz="1600" dirty="0" err="1"/>
+              <a:t>merged</a:t>
             </a:r>
             <a:r>
               <a:rPr lang="fr-FR" sz="1600" dirty="0"/>
@@ -18251,14 +18243,6 @@
             <a:r>
               <a:rPr lang="fr-FR" sz="1600" dirty="0" err="1"/>
               <a:t>handle</a:t>
-            </a:r>
-            <a:r>
-              <a:rPr lang="fr-FR" sz="1600" dirty="0"/>
-              <a:t> </a:t>
-            </a:r>
-            <a:r>
-              <a:rPr lang="fr-FR" sz="1600" dirty="0" err="1"/>
-              <a:t>our</a:t>
             </a:r>
             <a:r>
               <a:rPr lang="fr-FR" sz="1600" dirty="0"/>
@@ -18743,12 +18727,49 @@
           </a:p>
         </p:txBody>
       </p:sp>
+      <p:sp>
+        <p:nvSpPr>
+          <p:cNvPr id="9" name="ZoneTexte 8">
+            <a:extLst>
+              <a:ext uri="{FF2B5EF4-FFF2-40B4-BE49-F238E27FC236}">
+                <a16:creationId xmlns:a16="http://schemas.microsoft.com/office/drawing/2014/main" id="{E757D88A-8F24-4C57-9869-7F6002B1ABB0}"/>
+              </a:ext>
+            </a:extLst>
+          </p:cNvPr>
+          <p:cNvSpPr txBox="1"/>
+          <p:nvPr/>
+        </p:nvSpPr>
+        <p:spPr>
+          <a:xfrm>
+            <a:off x="2584939" y="5438403"/>
+            <a:ext cx="7200900" cy="646331"/>
+          </a:xfrm>
+          <a:prstGeom prst="rect">
+            <a:avLst/>
+          </a:prstGeom>
+          <a:noFill/>
+        </p:spPr>
+        <p:txBody>
+          <a:bodyPr wrap="square" rtlCol="0">
+            <a:spAutoFit/>
+          </a:bodyPr>
+          <a:lstStyle/>
+          <a:p>
+            <a:pPr algn="just"/>
+            <a:r>
+              <a:rPr lang="en-US" dirty="0"/>
+              <a:t>Jest is an open source testing framework for JavaScript. We will use it in order to handle our tests on the Ionic2 framework.</a:t>
+            </a:r>
+            <a:endParaRPr lang="fr-FR" dirty="0"/>
+          </a:p>
+        </p:txBody>
+      </p:sp>
       <p:pic>
         <p:nvPicPr>
-          <p:cNvPr id="1034" name="Picture 10" descr="Résultat de recherche d'images pour &quot;jasmine logo&quot;">
+          <p:cNvPr id="3" name="Picture 2" descr="Image result for jestjs logo">
             <a:extLst>
               <a:ext uri="{FF2B5EF4-FFF2-40B4-BE49-F238E27FC236}">
-                <a16:creationId xmlns:a16="http://schemas.microsoft.com/office/drawing/2014/main" id="{59C8A3FE-BB45-47CA-9842-30368F2B6828}"/>
+                <a16:creationId xmlns:a16="http://schemas.microsoft.com/office/drawing/2014/main" id="{4C8DFF18-C990-45CB-BE33-FF972A90BA46}"/>
               </a:ext>
             </a:extLst>
           </p:cNvPr>
@@ -18757,7 +18778,7 @@
           </p:cNvPicPr>
           <p:nvPr/>
         </p:nvPicPr>
-        <p:blipFill>
+        <p:blipFill rotWithShape="1">
           <a:blip r:embed="rId6">
             <a:extLst>
               <a:ext uri="{28A0092B-C50C-407E-A947-70E740481C1C}">
@@ -18765,15 +18786,13 @@
               </a:ext>
             </a:extLst>
           </a:blip>
-          <a:srcRect/>
-          <a:stretch>
-            <a:fillRect/>
-          </a:stretch>
+          <a:srcRect l="9172" t="18930" r="9495" b="19080"/>
+          <a:stretch/>
         </p:blipFill>
         <p:spPr bwMode="auto">
           <a:xfrm>
-            <a:off x="10067192" y="5203251"/>
-            <a:ext cx="1437420" cy="1190663"/>
+            <a:off x="10107730" y="5105145"/>
+            <a:ext cx="1203333" cy="1219168"/>
           </a:xfrm>
           <a:prstGeom prst="rect">
             <a:avLst/>
@@ -18790,43 +18809,6 @@
           </a:extLst>
         </p:spPr>
       </p:pic>
-      <p:sp>
-        <p:nvSpPr>
-          <p:cNvPr id="9" name="ZoneTexte 8">
-            <a:extLst>
-              <a:ext uri="{FF2B5EF4-FFF2-40B4-BE49-F238E27FC236}">
-                <a16:creationId xmlns:a16="http://schemas.microsoft.com/office/drawing/2014/main" id="{E757D88A-8F24-4C57-9869-7F6002B1ABB0}"/>
-              </a:ext>
-            </a:extLst>
-          </p:cNvPr>
-          <p:cNvSpPr txBox="1"/>
-          <p:nvPr/>
-        </p:nvSpPr>
-        <p:spPr>
-          <a:xfrm>
-            <a:off x="2584939" y="5341986"/>
-            <a:ext cx="7200900" cy="923330"/>
-          </a:xfrm>
-          <a:prstGeom prst="rect">
-            <a:avLst/>
-          </a:prstGeom>
-          <a:noFill/>
-        </p:spPr>
-        <p:txBody>
-          <a:bodyPr wrap="square" rtlCol="0">
-            <a:spAutoFit/>
-          </a:bodyPr>
-          <a:lstStyle/>
-          <a:p>
-            <a:pPr algn="just"/>
-            <a:r>
-              <a:rPr lang="en-US" dirty="0"/>
-              <a:t>Jasmine is an open source testing framework for JavaScript. We will use it for doing our Android tests, as well as Karma for running our tests.</a:t>
-            </a:r>
-            <a:endParaRPr lang="fr-FR" dirty="0"/>
-          </a:p>
-        </p:txBody>
-      </p:sp>
     </p:spTree>
     <p:extLst>
       <p:ext uri="{BB962C8B-B14F-4D97-AF65-F5344CB8AC3E}">
@@ -21013,7 +20995,7 @@
             </a:r>
             <a:r>
               <a:rPr lang="fr-FR" sz="1600" dirty="0" err="1"/>
-              <a:t>implementations</a:t>
+              <a:t>implementation</a:t>
             </a:r>
             <a:r>
               <a:rPr lang="fr-FR" sz="1600" dirty="0"/>
@@ -21061,7 +21043,7 @@
             </a:r>
             <a:r>
               <a:rPr lang="fr-FR" sz="1600" dirty="0" err="1"/>
-              <a:t>which</a:t>
+              <a:t>that</a:t>
             </a:r>
             <a:r>
               <a:rPr lang="fr-FR" sz="1600" dirty="0"/>
@@ -21323,7 +21305,7 @@
         </p:nvSpPr>
         <p:spPr>
           <a:xfrm>
-            <a:off x="2589212" y="1905000"/>
+            <a:off x="2404654" y="1905000"/>
             <a:ext cx="4900418" cy="4100290"/>
           </a:xfrm>
         </p:spPr>
@@ -21333,6 +21315,7 @@
           </a:bodyPr>
           <a:lstStyle/>
           <a:p>
+            <a:pPr algn="just"/>
             <a:r>
               <a:rPr lang="fr-FR" sz="1600" b="1" dirty="0"/>
               <a:t>Product </a:t>
@@ -21415,16 +21398,18 @@
             </a:r>
           </a:p>
           <a:p>
+            <a:pPr algn="just"/>
             <a:endParaRPr lang="fr-FR" sz="1600" b="1" dirty="0"/>
           </a:p>
           <a:p>
+            <a:pPr algn="just"/>
             <a:r>
               <a:rPr lang="fr-FR" sz="1600" b="1" dirty="0"/>
               <a:t>Scrum Master : </a:t>
             </a:r>
             <a:r>
               <a:rPr lang="fr-FR" sz="1600" dirty="0" err="1"/>
-              <a:t>Ensure</a:t>
+              <a:t>Ensures</a:t>
             </a:r>
             <a:r>
               <a:rPr lang="fr-FR" sz="1600" dirty="0"/>
@@ -21504,9 +21489,11 @@
             </a:r>
           </a:p>
           <a:p>
+            <a:pPr algn="just"/>
             <a:endParaRPr lang="fr-FR" sz="1600" b="1" dirty="0"/>
           </a:p>
           <a:p>
+            <a:pPr algn="just"/>
             <a:r>
               <a:rPr lang="fr-FR" sz="1600" b="1" dirty="0" err="1"/>
               <a:t>Developers</a:t>
@@ -21661,9 +21648,11 @@
             </a:r>
           </a:p>
           <a:p>
+            <a:pPr algn="just"/>
             <a:endParaRPr lang="fr-FR" sz="1600" dirty="0"/>
           </a:p>
           <a:p>
+            <a:pPr algn="just"/>
             <a:endParaRPr lang="fr-FR" sz="1600" dirty="0"/>
           </a:p>
         </p:txBody>
@@ -21804,7 +21793,7 @@
         </p:nvSpPr>
         <p:spPr>
           <a:xfrm>
-            <a:off x="1512277" y="2693142"/>
+            <a:off x="1436776" y="2693142"/>
             <a:ext cx="5125915" cy="3435241"/>
           </a:xfrm>
         </p:spPr>
@@ -22215,7 +22204,7 @@
         </p:nvSpPr>
         <p:spPr>
           <a:xfrm>
-            <a:off x="1967388" y="2106168"/>
+            <a:off x="1927427" y="1905000"/>
             <a:ext cx="8911687" cy="861774"/>
           </a:xfrm>
           <a:prstGeom prst="rect">

</xml_diff>